<commit_message>
Pushed further updated graphics and minor updates to the presentation
</commit_message>
<xml_diff>
--- a/Presentations/Week 6 Presentation/Group 16 Presentation.pptx
+++ b/Presentations/Week 6 Presentation/Group 16 Presentation.pptx
@@ -3805,7 +3805,7 @@
         </p:blipFill>
         <p:spPr>
           <a:xfrm>
-            <a:off x="2426677" y="240323"/>
+            <a:off x="2426677" y="198378"/>
             <a:ext cx="167351" cy="446270"/>
           </a:xfrm>
           <a:prstGeom prst="rect">
@@ -4230,7 +4230,11 @@
           <a:lstStyle/>
           <a:p>
             <a:r>
-              <a:rPr lang="en-GB" dirty="0"/>
+              <a:rPr lang="en-GB" dirty="0">
+                <a:solidFill>
+                  <a:schemeClr val="bg1"/>
+                </a:solidFill>
+              </a:rPr>
               <a:t>Kickback Mechanic</a:t>
             </a:r>
           </a:p>
@@ -4257,7 +4261,46 @@
           <a:bodyPr/>
           <a:lstStyle/>
           <a:p>
-            <a:endParaRPr lang="en-GB" dirty="0"/>
+            <a:r>
+              <a:rPr lang="en-GB" dirty="0">
+                <a:solidFill>
+                  <a:schemeClr val="bg1"/>
+                </a:solidFill>
+              </a:rPr>
+              <a:t>Provides new risk/reward dynamic not typically seen in run and gun roguelikes</a:t>
+            </a:r>
+          </a:p>
+          <a:p>
+            <a:pPr lvl="1"/>
+            <a:r>
+              <a:rPr lang="en-GB" dirty="0">
+                <a:solidFill>
+                  <a:schemeClr val="bg1"/>
+                </a:solidFill>
+              </a:rPr>
+              <a:t>Optimise movement vs Focus on killing enemies</a:t>
+            </a:r>
+          </a:p>
+          <a:p>
+            <a:r>
+              <a:rPr lang="en-GB" dirty="0">
+                <a:solidFill>
+                  <a:schemeClr val="bg1"/>
+                </a:solidFill>
+              </a:rPr>
+              <a:t>Neatly creates a new set of unique design challenges to facilitate the “creative solutions” and “promotion of distinct game designs” outlined in the brief</a:t>
+            </a:r>
+          </a:p>
+          <a:p>
+            <a:pPr lvl="1"/>
+            <a:r>
+              <a:rPr lang="en-GB" dirty="0">
+                <a:solidFill>
+                  <a:schemeClr val="bg1"/>
+                </a:solidFill>
+              </a:rPr>
+              <a:t>Examples include balancing room design to accommodate for revised movement and designing enemies/environmental hazards that utilize the core mechanic in interesting and fair ways</a:t>
+            </a:r>
           </a:p>
         </p:txBody>
       </p:sp>
@@ -4305,62 +4348,6 @@
           <a:chExt cx="0" cy="0"/>
         </a:xfrm>
       </p:grpSpPr>
-      <p:sp>
-        <p:nvSpPr>
-          <p:cNvPr id="2" name="Title 1">
-            <a:extLst>
-              <a:ext uri="{FF2B5EF4-FFF2-40B4-BE49-F238E27FC236}">
-                <a16:creationId xmlns:a16="http://schemas.microsoft.com/office/drawing/2014/main" id="{978A3F3F-7097-4B09-905D-8491C8F1A91A}"/>
-              </a:ext>
-            </a:extLst>
-          </p:cNvPr>
-          <p:cNvSpPr>
-            <a:spLocks noGrp="1"/>
-          </p:cNvSpPr>
-          <p:nvPr>
-            <p:ph type="title"/>
-          </p:nvPr>
-        </p:nvSpPr>
-        <p:spPr/>
-        <p:txBody>
-          <a:bodyPr/>
-          <a:lstStyle/>
-          <a:p>
-            <a:r>
-              <a:rPr lang="en-GB" dirty="0"/>
-              <a:t>Core Game Loop</a:t>
-            </a:r>
-          </a:p>
-        </p:txBody>
-      </p:sp>
-      <p:sp>
-        <p:nvSpPr>
-          <p:cNvPr id="3" name="Content Placeholder 2">
-            <a:extLst>
-              <a:ext uri="{FF2B5EF4-FFF2-40B4-BE49-F238E27FC236}">
-                <a16:creationId xmlns:a16="http://schemas.microsoft.com/office/drawing/2014/main" id="{814B93D7-1849-4043-B901-B51A4E7D4430}"/>
-              </a:ext>
-            </a:extLst>
-          </p:cNvPr>
-          <p:cNvSpPr>
-            <a:spLocks noGrp="1"/>
-          </p:cNvSpPr>
-          <p:nvPr>
-            <p:ph idx="1"/>
-          </p:nvPr>
-        </p:nvSpPr>
-        <p:spPr/>
-        <p:txBody>
-          <a:bodyPr/>
-          <a:lstStyle/>
-          <a:p>
-            <a:r>
-              <a:rPr lang="en-GB" dirty="0"/>
-              <a:t>Aim -&gt; Shoot -&gt; Kickback Movement</a:t>
-            </a:r>
-          </a:p>
-        </p:txBody>
-      </p:sp>
     </p:spTree>
     <p:extLst>
       <p:ext uri="{BB962C8B-B14F-4D97-AF65-F5344CB8AC3E}">
@@ -4763,6 +4750,16 @@
                   <a:schemeClr val="bg1"/>
                 </a:solidFill>
               </a:rPr>
+              <a:t>Full implementation of dungeon, character and weapon assets</a:t>
+            </a:r>
+          </a:p>
+          <a:p>
+            <a:r>
+              <a:rPr lang="en-GB" dirty="0">
+                <a:solidFill>
+                  <a:schemeClr val="bg1"/>
+                </a:solidFill>
+              </a:rPr>
               <a:t>A playtested, iterated and generally polished core mechanic</a:t>
             </a:r>
           </a:p>
@@ -4812,59 +4809,150 @@
           <a:chExt cx="0" cy="0"/>
         </a:xfrm>
       </p:grpSpPr>
-      <p:sp>
-        <p:nvSpPr>
-          <p:cNvPr id="2" name="Title 1">
-            <a:extLst>
-              <a:ext uri="{FF2B5EF4-FFF2-40B4-BE49-F238E27FC236}">
-                <a16:creationId xmlns:a16="http://schemas.microsoft.com/office/drawing/2014/main" id="{A07D550D-71EB-4B6A-BBDD-55F068B4A974}"/>
-              </a:ext>
-            </a:extLst>
-          </p:cNvPr>
-          <p:cNvSpPr>
-            <a:spLocks noGrp="1"/>
-          </p:cNvSpPr>
-          <p:nvPr>
-            <p:ph type="title"/>
-          </p:nvPr>
-        </p:nvSpPr>
-        <p:spPr/>
-        <p:txBody>
-          <a:bodyPr/>
-          <a:lstStyle/>
-          <a:p>
-            <a:r>
-              <a:rPr lang="en-GB" dirty="0"/>
-              <a:t>Questions?</a:t>
-            </a:r>
-          </a:p>
-        </p:txBody>
-      </p:sp>
-      <p:sp>
-        <p:nvSpPr>
-          <p:cNvPr id="3" name="Content Placeholder 2">
-            <a:extLst>
-              <a:ext uri="{FF2B5EF4-FFF2-40B4-BE49-F238E27FC236}">
-                <a16:creationId xmlns:a16="http://schemas.microsoft.com/office/drawing/2014/main" id="{07367E9C-2ADF-4C63-A540-2CE07FFB999C}"/>
-              </a:ext>
-            </a:extLst>
-          </p:cNvPr>
-          <p:cNvSpPr>
-            <a:spLocks noGrp="1"/>
-          </p:cNvSpPr>
-          <p:nvPr>
-            <p:ph idx="1"/>
-          </p:nvPr>
-        </p:nvSpPr>
-        <p:spPr/>
-        <p:txBody>
-          <a:bodyPr/>
-          <a:lstStyle/>
-          <a:p>
-            <a:endParaRPr lang="en-GB"/>
-          </a:p>
-        </p:txBody>
-      </p:sp>
+      <p:pic>
+        <p:nvPicPr>
+          <p:cNvPr id="4" name="Picture 3">
+            <a:extLst>
+              <a:ext uri="{FF2B5EF4-FFF2-40B4-BE49-F238E27FC236}">
+                <a16:creationId xmlns:a16="http://schemas.microsoft.com/office/drawing/2014/main" id="{6CFBD5F8-8508-4D74-967A-F3DC13754B2E}"/>
+              </a:ext>
+            </a:extLst>
+          </p:cNvPr>
+          <p:cNvPicPr>
+            <a:picLocks noChangeAspect="1"/>
+          </p:cNvPicPr>
+          <p:nvPr/>
+        </p:nvPicPr>
+        <p:blipFill>
+          <a:blip r:embed="rId3">
+            <a:extLst>
+              <a:ext uri="{28A0092B-C50C-407E-A947-70E740481C1C}">
+                <a14:useLocalDpi xmlns:a14="http://schemas.microsoft.com/office/drawing/2010/main" val="0"/>
+              </a:ext>
+            </a:extLst>
+          </a:blip>
+          <a:stretch>
+            <a:fillRect/>
+          </a:stretch>
+        </p:blipFill>
+        <p:spPr>
+          <a:xfrm>
+            <a:off x="4239355" y="240323"/>
+            <a:ext cx="167351" cy="446270"/>
+          </a:xfrm>
+          <a:prstGeom prst="rect">
+            <a:avLst/>
+          </a:prstGeom>
+        </p:spPr>
+      </p:pic>
+      <p:pic>
+        <p:nvPicPr>
+          <p:cNvPr id="5" name="Picture 4">
+            <a:extLst>
+              <a:ext uri="{FF2B5EF4-FFF2-40B4-BE49-F238E27FC236}">
+                <a16:creationId xmlns:a16="http://schemas.microsoft.com/office/drawing/2014/main" id="{05F66811-53F9-4DFF-8FB2-5D65335A7A10}"/>
+              </a:ext>
+            </a:extLst>
+          </p:cNvPr>
+          <p:cNvPicPr>
+            <a:picLocks noChangeAspect="1"/>
+          </p:cNvPicPr>
+          <p:nvPr/>
+        </p:nvPicPr>
+        <p:blipFill>
+          <a:blip r:embed="rId3">
+            <a:extLst>
+              <a:ext uri="{28A0092B-C50C-407E-A947-70E740481C1C}">
+                <a14:useLocalDpi xmlns:a14="http://schemas.microsoft.com/office/drawing/2010/main" val="0"/>
+              </a:ext>
+            </a:extLst>
+          </a:blip>
+          <a:stretch>
+            <a:fillRect/>
+          </a:stretch>
+        </p:blipFill>
+        <p:spPr>
+          <a:xfrm>
+            <a:off x="7825004" y="240323"/>
+            <a:ext cx="167351" cy="446270"/>
+          </a:xfrm>
+          <a:prstGeom prst="rect">
+            <a:avLst/>
+          </a:prstGeom>
+        </p:spPr>
+      </p:pic>
+      <p:pic>
+        <p:nvPicPr>
+          <p:cNvPr id="6" name="Picture 5">
+            <a:extLst>
+              <a:ext uri="{FF2B5EF4-FFF2-40B4-BE49-F238E27FC236}">
+                <a16:creationId xmlns:a16="http://schemas.microsoft.com/office/drawing/2014/main" id="{D5CA3704-FD34-4809-A63E-64E99DC7B808}"/>
+              </a:ext>
+            </a:extLst>
+          </p:cNvPr>
+          <p:cNvPicPr>
+            <a:picLocks noChangeAspect="1"/>
+          </p:cNvPicPr>
+          <p:nvPr/>
+        </p:nvPicPr>
+        <p:blipFill>
+          <a:blip r:embed="rId3">
+            <a:extLst>
+              <a:ext uri="{28A0092B-C50C-407E-A947-70E740481C1C}">
+                <a14:useLocalDpi xmlns:a14="http://schemas.microsoft.com/office/drawing/2010/main" val="0"/>
+              </a:ext>
+            </a:extLst>
+          </a:blip>
+          <a:stretch>
+            <a:fillRect/>
+          </a:stretch>
+        </p:blipFill>
+        <p:spPr>
+          <a:xfrm>
+            <a:off x="2426677" y="240323"/>
+            <a:ext cx="167351" cy="446270"/>
+          </a:xfrm>
+          <a:prstGeom prst="rect">
+            <a:avLst/>
+          </a:prstGeom>
+        </p:spPr>
+      </p:pic>
+      <p:pic>
+        <p:nvPicPr>
+          <p:cNvPr id="7" name="Picture 6">
+            <a:extLst>
+              <a:ext uri="{FF2B5EF4-FFF2-40B4-BE49-F238E27FC236}">
+                <a16:creationId xmlns:a16="http://schemas.microsoft.com/office/drawing/2014/main" id="{E8A532D8-9E0D-4538-B7B8-4615DAE1B7D0}"/>
+              </a:ext>
+            </a:extLst>
+          </p:cNvPr>
+          <p:cNvPicPr>
+            <a:picLocks noChangeAspect="1"/>
+          </p:cNvPicPr>
+          <p:nvPr/>
+        </p:nvPicPr>
+        <p:blipFill>
+          <a:blip r:embed="rId3">
+            <a:extLst>
+              <a:ext uri="{28A0092B-C50C-407E-A947-70E740481C1C}">
+                <a14:useLocalDpi xmlns:a14="http://schemas.microsoft.com/office/drawing/2010/main" val="0"/>
+              </a:ext>
+            </a:extLst>
+          </a:blip>
+          <a:stretch>
+            <a:fillRect/>
+          </a:stretch>
+        </p:blipFill>
+        <p:spPr>
+          <a:xfrm>
+            <a:off x="9597972" y="240323"/>
+            <a:ext cx="167351" cy="446270"/>
+          </a:xfrm>
+          <a:prstGeom prst="rect">
+            <a:avLst/>
+          </a:prstGeom>
+        </p:spPr>
+      </p:pic>
     </p:spTree>
     <p:extLst>
       <p:ext uri="{BB962C8B-B14F-4D97-AF65-F5344CB8AC3E}">

</xml_diff>